<commit_message>
chane week 2 in report
</commit_message>
<xml_diff>
--- a/Capstone-Project-Report.pptx
+++ b/Capstone-Project-Report.pptx
@@ -5873,7 +5873,7 @@
             </a:r>
             <a:r>
               <a:rPr lang="en-US" sz="3200" dirty="0"/>
-              <a:t>: Capstone Project - A recommendation system for coworking spaces in Tunisia (week 1)</a:t>
+              <a:t>: Capstone Project - A recommendation system for coworking spaces in Tunisia (week 2)</a:t>
             </a:r>
             <a:endParaRPr sz="3200" dirty="0"/>
           </a:p>
@@ -5927,7 +5927,7 @@
                   <a:schemeClr val="tx1"/>
                 </a:solidFill>
               </a:rPr>
-              <a:t>: 20/02/2019</a:t>
+              <a:t>: 21/02/2019</a:t>
             </a:r>
             <a:endParaRPr dirty="0">
               <a:solidFill>

</xml_diff>